<commit_message>
Completed displaying a Constant line
</commit_message>
<xml_diff>
--- a/powerbi-plot-multiple-years/docs/ppt/v4-how-to-achieve.pptx
+++ b/powerbi-plot-multiple-years/docs/ppt/v4-how-to-achieve.pptx
@@ -9,6 +9,7 @@
     <p:sldId id="259" r:id="rId3"/>
     <p:sldId id="260" r:id="rId4"/>
     <p:sldId id="261" r:id="rId5"/>
+    <p:sldId id="262" r:id="rId6"/>
   </p:sldIdLst>
   <p:sldSz cx="12192000" cy="6858000"/>
   <p:notesSz cx="6858000" cy="9144000"/>
@@ -4496,6 +4497,313 @@
 </p:sld>
 </file>
 
+<file path=ppt/slides/slide5.xml><?xml version="1.0" encoding="utf-8"?>
+<p:sld xmlns:a="http://schemas.openxmlformats.org/drawingml/2006/main" xmlns:r="http://schemas.openxmlformats.org/officeDocument/2006/relationships" xmlns:p="http://schemas.openxmlformats.org/presentationml/2006/main">
+  <p:cSld>
+    <p:spTree>
+      <p:nvGrpSpPr>
+        <p:cNvPr id="1" name=""/>
+        <p:cNvGrpSpPr/>
+        <p:nvPr/>
+      </p:nvGrpSpPr>
+      <p:grpSpPr>
+        <a:xfrm>
+          <a:off x="0" y="0"/>
+          <a:ext cx="0" cy="0"/>
+          <a:chOff x="0" y="0"/>
+          <a:chExt cx="0" cy="0"/>
+        </a:xfrm>
+      </p:grpSpPr>
+      <p:pic>
+        <p:nvPicPr>
+          <p:cNvPr id="7" name="Picture 6">
+            <a:extLst>
+              <a:ext uri="{FF2B5EF4-FFF2-40B4-BE49-F238E27FC236}">
+                <a16:creationId xmlns:a16="http://schemas.microsoft.com/office/drawing/2014/main" id="{7108A898-FC10-7B2F-FA64-90C0FC1EF9D4}"/>
+              </a:ext>
+            </a:extLst>
+          </p:cNvPr>
+          <p:cNvPicPr>
+            <a:picLocks noChangeAspect="1"/>
+          </p:cNvPicPr>
+          <p:nvPr/>
+        </p:nvPicPr>
+        <p:blipFill>
+          <a:blip r:embed="rId2"/>
+          <a:stretch>
+            <a:fillRect/>
+          </a:stretch>
+        </p:blipFill>
+        <p:spPr>
+          <a:xfrm>
+            <a:off x="0" y="847243"/>
+            <a:ext cx="12192000" cy="5163514"/>
+          </a:xfrm>
+          <a:prstGeom prst="rect">
+            <a:avLst/>
+          </a:prstGeom>
+        </p:spPr>
+      </p:pic>
+      <p:sp>
+        <p:nvSpPr>
+          <p:cNvPr id="8" name="Rectangle 7">
+            <a:extLst>
+              <a:ext uri="{FF2B5EF4-FFF2-40B4-BE49-F238E27FC236}">
+                <a16:creationId xmlns:a16="http://schemas.microsoft.com/office/drawing/2014/main" id="{11FFD80F-8E1A-5402-7DAA-D15A4C1F4D49}"/>
+              </a:ext>
+            </a:extLst>
+          </p:cNvPr>
+          <p:cNvSpPr/>
+          <p:nvPr/>
+        </p:nvSpPr>
+        <p:spPr>
+          <a:xfrm>
+            <a:off x="11241247" y="2574071"/>
+            <a:ext cx="846445" cy="185907"/>
+          </a:xfrm>
+          <a:prstGeom prst="rect">
+            <a:avLst/>
+          </a:prstGeom>
+          <a:solidFill>
+            <a:schemeClr val="bg1">
+              <a:alpha val="0"/>
+            </a:schemeClr>
+          </a:solidFill>
+          <a:ln w="19050"/>
+        </p:spPr>
+        <p:style>
+          <a:lnRef idx="2">
+            <a:schemeClr val="accent1">
+              <a:shade val="50000"/>
+            </a:schemeClr>
+          </a:lnRef>
+          <a:fillRef idx="1">
+            <a:schemeClr val="accent1"/>
+          </a:fillRef>
+          <a:effectRef idx="0">
+            <a:schemeClr val="accent1"/>
+          </a:effectRef>
+          <a:fontRef idx="minor">
+            <a:schemeClr val="lt1"/>
+          </a:fontRef>
+        </p:style>
+        <p:txBody>
+          <a:bodyPr rtlCol="0" anchor="ctr"/>
+          <a:lstStyle/>
+          <a:p>
+            <a:pPr algn="ctr"/>
+            <a:endParaRPr lang="en-GB"/>
+          </a:p>
+        </p:txBody>
+      </p:sp>
+      <p:sp>
+        <p:nvSpPr>
+          <p:cNvPr id="9" name="Speech Bubble: Rectangle 8">
+            <a:extLst>
+              <a:ext uri="{FF2B5EF4-FFF2-40B4-BE49-F238E27FC236}">
+                <a16:creationId xmlns:a16="http://schemas.microsoft.com/office/drawing/2014/main" id="{B032D9B2-E686-27A0-BAAB-200D8F5816C5}"/>
+              </a:ext>
+            </a:extLst>
+          </p:cNvPr>
+          <p:cNvSpPr/>
+          <p:nvPr/>
+        </p:nvSpPr>
+        <p:spPr>
+          <a:xfrm>
+            <a:off x="4924147" y="118895"/>
+            <a:ext cx="3565512" cy="369332"/>
+          </a:xfrm>
+          <a:prstGeom prst="wedgeRectCallout">
+            <a:avLst>
+              <a:gd name="adj1" fmla="val 142890"/>
+              <a:gd name="adj2" fmla="val 640384"/>
+            </a:avLst>
+          </a:prstGeom>
+          <a:solidFill>
+            <a:srgbClr val="FFFF00"/>
+          </a:solidFill>
+          <a:ln>
+            <a:solidFill>
+              <a:schemeClr val="tx1"/>
+            </a:solidFill>
+          </a:ln>
+        </p:spPr>
+        <p:txBody>
+          <a:bodyPr wrap="square" rtlCol="0">
+            <a:spAutoFit/>
+          </a:bodyPr>
+          <a:lstStyle/>
+          <a:p>
+            <a:r>
+              <a:rPr lang="en-GB" dirty="0"/>
+              <a:t>DAX measure to give mean sales</a:t>
+            </a:r>
+            <a:endParaRPr lang="en-GB" dirty="0">
+              <a:solidFill>
+                <a:schemeClr val="tx1"/>
+              </a:solidFill>
+            </a:endParaRPr>
+          </a:p>
+        </p:txBody>
+      </p:sp>
+      <p:sp>
+        <p:nvSpPr>
+          <p:cNvPr id="10" name="Speech Bubble: Rectangle 9">
+            <a:extLst>
+              <a:ext uri="{FF2B5EF4-FFF2-40B4-BE49-F238E27FC236}">
+                <a16:creationId xmlns:a16="http://schemas.microsoft.com/office/drawing/2014/main" id="{B08461F8-AD17-7094-F6E2-89DA30B63F57}"/>
+              </a:ext>
+            </a:extLst>
+          </p:cNvPr>
+          <p:cNvSpPr/>
+          <p:nvPr/>
+        </p:nvSpPr>
+        <p:spPr>
+          <a:xfrm>
+            <a:off x="1125332" y="118895"/>
+            <a:ext cx="3565512" cy="369332"/>
+          </a:xfrm>
+          <a:prstGeom prst="wedgeRectCallout">
+            <a:avLst>
+              <a:gd name="adj1" fmla="val 93951"/>
+              <a:gd name="adj2" fmla="val 949294"/>
+            </a:avLst>
+          </a:prstGeom>
+          <a:solidFill>
+            <a:srgbClr val="FFFF00"/>
+          </a:solidFill>
+          <a:ln>
+            <a:solidFill>
+              <a:schemeClr val="tx1"/>
+            </a:solidFill>
+          </a:ln>
+        </p:spPr>
+        <p:txBody>
+          <a:bodyPr wrap="square" rtlCol="0">
+            <a:spAutoFit/>
+          </a:bodyPr>
+          <a:lstStyle/>
+          <a:p>
+            <a:r>
+              <a:rPr lang="en-GB" dirty="0"/>
+              <a:t>Constant line to indicate mean sales</a:t>
+            </a:r>
+            <a:endParaRPr lang="en-GB" dirty="0">
+              <a:solidFill>
+                <a:schemeClr val="tx1"/>
+              </a:solidFill>
+            </a:endParaRPr>
+          </a:p>
+        </p:txBody>
+      </p:sp>
+      <p:sp>
+        <p:nvSpPr>
+          <p:cNvPr id="11" name="Rectangle 10">
+            <a:extLst>
+              <a:ext uri="{FF2B5EF4-FFF2-40B4-BE49-F238E27FC236}">
+                <a16:creationId xmlns:a16="http://schemas.microsoft.com/office/drawing/2014/main" id="{62A7A29A-1FBF-5CE6-7CE8-26B0845F5E93}"/>
+              </a:ext>
+            </a:extLst>
+          </p:cNvPr>
+          <p:cNvSpPr/>
+          <p:nvPr/>
+        </p:nvSpPr>
+        <p:spPr>
+          <a:xfrm>
+            <a:off x="9799739" y="2290243"/>
+            <a:ext cx="1240173" cy="3036766"/>
+          </a:xfrm>
+          <a:prstGeom prst="rect">
+            <a:avLst/>
+          </a:prstGeom>
+          <a:solidFill>
+            <a:schemeClr val="bg1">
+              <a:alpha val="0"/>
+            </a:schemeClr>
+          </a:solidFill>
+          <a:ln w="19050"/>
+        </p:spPr>
+        <p:style>
+          <a:lnRef idx="2">
+            <a:schemeClr val="accent1">
+              <a:shade val="50000"/>
+            </a:schemeClr>
+          </a:lnRef>
+          <a:fillRef idx="1">
+            <a:schemeClr val="accent1"/>
+          </a:fillRef>
+          <a:effectRef idx="0">
+            <a:schemeClr val="accent1"/>
+          </a:effectRef>
+          <a:fontRef idx="minor">
+            <a:schemeClr val="lt1"/>
+          </a:fontRef>
+        </p:style>
+        <p:txBody>
+          <a:bodyPr rtlCol="0" anchor="ctr"/>
+          <a:lstStyle/>
+          <a:p>
+            <a:pPr algn="ctr"/>
+            <a:endParaRPr lang="en-GB"/>
+          </a:p>
+        </p:txBody>
+      </p:sp>
+      <p:sp>
+        <p:nvSpPr>
+          <p:cNvPr id="12" name="Arrow: Left-Right 11">
+            <a:extLst>
+              <a:ext uri="{FF2B5EF4-FFF2-40B4-BE49-F238E27FC236}">
+                <a16:creationId xmlns:a16="http://schemas.microsoft.com/office/drawing/2014/main" id="{953FB755-952E-E130-7BBD-5302304DC079}"/>
+              </a:ext>
+            </a:extLst>
+          </p:cNvPr>
+          <p:cNvSpPr/>
+          <p:nvPr/>
+        </p:nvSpPr>
+        <p:spPr>
+          <a:xfrm rot="20069097">
+            <a:off x="10443864" y="2762733"/>
+            <a:ext cx="949941" cy="326690"/>
+          </a:xfrm>
+          <a:prstGeom prst="leftRightArrow">
+            <a:avLst/>
+          </a:prstGeom>
+          <a:solidFill>
+            <a:srgbClr val="FFFF00"/>
+          </a:solidFill>
+          <a:ln>
+            <a:solidFill>
+              <a:schemeClr val="tx1"/>
+            </a:solidFill>
+          </a:ln>
+        </p:spPr>
+        <p:txBody>
+          <a:bodyPr wrap="square" rtlCol="0">
+            <a:spAutoFit/>
+          </a:bodyPr>
+          <a:lstStyle/>
+          <a:p>
+            <a:endParaRPr lang="en-GB">
+              <a:solidFill>
+                <a:schemeClr val="tx1"/>
+              </a:solidFill>
+            </a:endParaRPr>
+          </a:p>
+        </p:txBody>
+      </p:sp>
+    </p:spTree>
+    <p:extLst>
+      <p:ext uri="{BB962C8B-B14F-4D97-AF65-F5344CB8AC3E}">
+        <p14:creationId xmlns:p14="http://schemas.microsoft.com/office/powerpoint/2010/main" val="992034396"/>
+      </p:ext>
+    </p:extLst>
+  </p:cSld>
+  <p:clrMapOvr>
+    <a:masterClrMapping/>
+  </p:clrMapOvr>
+</p:sld>
+</file>
+
 <file path=ppt/theme/theme1.xml><?xml version="1.0" encoding="utf-8"?>
 <a:theme xmlns:a="http://schemas.openxmlformats.org/drawingml/2006/main" name="Office Theme">
   <a:themeElements>

</xml_diff>